<commit_message>
Added a song player for single songs
</commit_message>
<xml_diff>
--- a/mockups/SonicWaveMockup.pptx
+++ b/mockups/SonicWaveMockup.pptx
@@ -222,7 +222,7 @@
           <a:p>
             <a:fld id="{0E757DC4-2315-4FE9-87C1-E5FAB21BBA1E}" type="datetimeFigureOut">
               <a:rPr lang="de-CH" smtClean="0"/>
-              <a:t>25.06.2025</a:t>
+              <a:t>24.07.2025</a:t>
             </a:fld>
             <a:endParaRPr lang="de-CH"/>
           </a:p>
@@ -2976,7 +2976,7 @@
           <a:p>
             <a:fld id="{8043C726-E4AC-4898-A7DA-106D25D4B538}" type="datetimeFigureOut">
               <a:rPr lang="de-CH" smtClean="0"/>
-              <a:t>25.06.2025</a:t>
+              <a:t>24.07.2025</a:t>
             </a:fld>
             <a:endParaRPr lang="de-CH"/>
           </a:p>
@@ -3176,7 +3176,7 @@
           <a:p>
             <a:fld id="{8043C726-E4AC-4898-A7DA-106D25D4B538}" type="datetimeFigureOut">
               <a:rPr lang="de-CH" smtClean="0"/>
-              <a:t>25.06.2025</a:t>
+              <a:t>24.07.2025</a:t>
             </a:fld>
             <a:endParaRPr lang="de-CH"/>
           </a:p>
@@ -3386,7 +3386,7 @@
           <a:p>
             <a:fld id="{8043C726-E4AC-4898-A7DA-106D25D4B538}" type="datetimeFigureOut">
               <a:rPr lang="de-CH" smtClean="0"/>
-              <a:t>25.06.2025</a:t>
+              <a:t>24.07.2025</a:t>
             </a:fld>
             <a:endParaRPr lang="de-CH"/>
           </a:p>
@@ -3586,7 +3586,7 @@
           <a:p>
             <a:fld id="{8043C726-E4AC-4898-A7DA-106D25D4B538}" type="datetimeFigureOut">
               <a:rPr lang="de-CH" smtClean="0"/>
-              <a:t>25.06.2025</a:t>
+              <a:t>24.07.2025</a:t>
             </a:fld>
             <a:endParaRPr lang="de-CH"/>
           </a:p>
@@ -3862,7 +3862,7 @@
           <a:p>
             <a:fld id="{8043C726-E4AC-4898-A7DA-106D25D4B538}" type="datetimeFigureOut">
               <a:rPr lang="de-CH" smtClean="0"/>
-              <a:t>25.06.2025</a:t>
+              <a:t>24.07.2025</a:t>
             </a:fld>
             <a:endParaRPr lang="de-CH"/>
           </a:p>
@@ -4130,7 +4130,7 @@
           <a:p>
             <a:fld id="{8043C726-E4AC-4898-A7DA-106D25D4B538}" type="datetimeFigureOut">
               <a:rPr lang="de-CH" smtClean="0"/>
-              <a:t>25.06.2025</a:t>
+              <a:t>24.07.2025</a:t>
             </a:fld>
             <a:endParaRPr lang="de-CH"/>
           </a:p>
@@ -4545,7 +4545,7 @@
           <a:p>
             <a:fld id="{8043C726-E4AC-4898-A7DA-106D25D4B538}" type="datetimeFigureOut">
               <a:rPr lang="de-CH" smtClean="0"/>
-              <a:t>25.06.2025</a:t>
+              <a:t>24.07.2025</a:t>
             </a:fld>
             <a:endParaRPr lang="de-CH"/>
           </a:p>
@@ -4687,7 +4687,7 @@
           <a:p>
             <a:fld id="{8043C726-E4AC-4898-A7DA-106D25D4B538}" type="datetimeFigureOut">
               <a:rPr lang="de-CH" smtClean="0"/>
-              <a:t>25.06.2025</a:t>
+              <a:t>24.07.2025</a:t>
             </a:fld>
             <a:endParaRPr lang="de-CH"/>
           </a:p>
@@ -4800,7 +4800,7 @@
           <a:p>
             <a:fld id="{8043C726-E4AC-4898-A7DA-106D25D4B538}" type="datetimeFigureOut">
               <a:rPr lang="de-CH" smtClean="0"/>
-              <a:t>25.06.2025</a:t>
+              <a:t>24.07.2025</a:t>
             </a:fld>
             <a:endParaRPr lang="de-CH"/>
           </a:p>
@@ -5113,7 +5113,7 @@
           <a:p>
             <a:fld id="{8043C726-E4AC-4898-A7DA-106D25D4B538}" type="datetimeFigureOut">
               <a:rPr lang="de-CH" smtClean="0"/>
-              <a:t>25.06.2025</a:t>
+              <a:t>24.07.2025</a:t>
             </a:fld>
             <a:endParaRPr lang="de-CH"/>
           </a:p>
@@ -5402,7 +5402,7 @@
           <a:p>
             <a:fld id="{8043C726-E4AC-4898-A7DA-106D25D4B538}" type="datetimeFigureOut">
               <a:rPr lang="de-CH" smtClean="0"/>
-              <a:t>25.06.2025</a:t>
+              <a:t>24.07.2025</a:t>
             </a:fld>
             <a:endParaRPr lang="de-CH"/>
           </a:p>
@@ -5645,7 +5645,7 @@
           <a:p>
             <a:fld id="{8043C726-E4AC-4898-A7DA-106D25D4B538}" type="datetimeFigureOut">
               <a:rPr lang="de-CH" smtClean="0"/>
-              <a:t>25.06.2025</a:t>
+              <a:t>24.07.2025</a:t>
             </a:fld>
             <a:endParaRPr lang="de-CH"/>
           </a:p>
@@ -9159,7 +9159,7 @@
         </p:blipFill>
         <p:spPr>
           <a:xfrm>
-            <a:off x="806970" y="863133"/>
+            <a:off x="806970" y="1317333"/>
             <a:ext cx="1379970" cy="1379970"/>
           </a:xfrm>
           <a:prstGeom prst="roundRect">
@@ -9183,8 +9183,8 @@
         </p:nvSpPr>
         <p:spPr>
           <a:xfrm>
-            <a:off x="2179320" y="1553118"/>
-            <a:ext cx="8316842" cy="707886"/>
+            <a:off x="2185237" y="1752401"/>
+            <a:ext cx="8316842" cy="830997"/>
           </a:xfrm>
           <a:prstGeom prst="rect">
             <a:avLst/>
@@ -9198,7 +9198,7 @@
           <a:lstStyle/>
           <a:p>
             <a:r>
-              <a:rPr lang="en-US" sz="4000" b="1" noProof="0" dirty="0">
+              <a:rPr lang="en-US" sz="4800" b="1" noProof="0" dirty="0">
                 <a:solidFill>
                   <a:schemeClr val="bg1"/>
                 </a:solidFill>
@@ -9223,7 +9223,7 @@
         </p:nvSpPr>
         <p:spPr>
           <a:xfrm>
-            <a:off x="2202180" y="918229"/>
+            <a:off x="2202180" y="1372429"/>
             <a:ext cx="1328220" cy="307777"/>
           </a:xfrm>
           <a:prstGeom prst="rect">
@@ -9263,7 +9263,7 @@
         </p:nvSpPr>
         <p:spPr>
           <a:xfrm>
-            <a:off x="10863780" y="925035"/>
+            <a:off x="10863780" y="1379235"/>
             <a:ext cx="1328220" cy="307777"/>
           </a:xfrm>
           <a:prstGeom prst="rect">
@@ -9303,7 +9303,7 @@
         </p:nvSpPr>
         <p:spPr>
           <a:xfrm>
-            <a:off x="1646299" y="3231681"/>
+            <a:off x="1646299" y="3685881"/>
             <a:ext cx="1350809" cy="276999"/>
           </a:xfrm>
           <a:prstGeom prst="rect">
@@ -9357,7 +9357,7 @@
         </p:blipFill>
         <p:spPr>
           <a:xfrm>
-            <a:off x="960099" y="3139349"/>
+            <a:off x="960099" y="3593549"/>
             <a:ext cx="461665" cy="461665"/>
           </a:xfrm>
           <a:prstGeom prst="roundRect">
@@ -9381,7 +9381,7 @@
         </p:nvSpPr>
         <p:spPr>
           <a:xfrm>
-            <a:off x="4229181" y="3231681"/>
+            <a:off x="4229181" y="3685881"/>
             <a:ext cx="637156" cy="276999"/>
           </a:xfrm>
           <a:prstGeom prst="rect">
@@ -9421,7 +9421,7 @@
         </p:nvSpPr>
         <p:spPr>
           <a:xfrm>
-            <a:off x="8653975" y="3231681"/>
+            <a:off x="8653975" y="3685881"/>
             <a:ext cx="584911" cy="276999"/>
           </a:xfrm>
           <a:prstGeom prst="rect">
@@ -9461,7 +9461,7 @@
         </p:nvSpPr>
         <p:spPr>
           <a:xfrm>
-            <a:off x="6357003" y="3231681"/>
+            <a:off x="6357003" y="3685881"/>
             <a:ext cx="584911" cy="276999"/>
           </a:xfrm>
           <a:prstGeom prst="rect">
@@ -9516,7 +9516,7 @@
         </p:blipFill>
         <p:spPr bwMode="auto">
           <a:xfrm>
-            <a:off x="11578407" y="3228128"/>
+            <a:off x="11578407" y="3682328"/>
             <a:ext cx="260064" cy="260064"/>
           </a:xfrm>
           <a:prstGeom prst="rect">
@@ -9563,7 +9563,7 @@
         </p:blipFill>
         <p:spPr bwMode="auto">
           <a:xfrm>
-            <a:off x="11257969" y="3224245"/>
+            <a:off x="11257969" y="3678445"/>
             <a:ext cx="260064" cy="260064"/>
           </a:xfrm>
           <a:prstGeom prst="rect">
@@ -9610,7 +9610,7 @@
         </p:blipFill>
         <p:spPr bwMode="auto">
           <a:xfrm>
-            <a:off x="10920596" y="3228128"/>
+            <a:off x="10920596" y="3682328"/>
             <a:ext cx="276999" cy="276999"/>
           </a:xfrm>
           <a:prstGeom prst="rect">
@@ -9642,7 +9642,7 @@
         </p:nvSpPr>
         <p:spPr>
           <a:xfrm>
-            <a:off x="1646299" y="4059189"/>
+            <a:off x="1646299" y="4513389"/>
             <a:ext cx="1350809" cy="276999"/>
           </a:xfrm>
           <a:prstGeom prst="rect">
@@ -9696,7 +9696,7 @@
         </p:blipFill>
         <p:spPr>
           <a:xfrm>
-            <a:off x="960099" y="3966857"/>
+            <a:off x="960099" y="4421057"/>
             <a:ext cx="461665" cy="461665"/>
           </a:xfrm>
           <a:prstGeom prst="roundRect">
@@ -9720,7 +9720,7 @@
         </p:nvSpPr>
         <p:spPr>
           <a:xfrm>
-            <a:off x="4229181" y="4059189"/>
+            <a:off x="4229181" y="4513389"/>
             <a:ext cx="637156" cy="276999"/>
           </a:xfrm>
           <a:prstGeom prst="rect">
@@ -9760,7 +9760,7 @@
         </p:nvSpPr>
         <p:spPr>
           <a:xfrm>
-            <a:off x="8653975" y="4059189"/>
+            <a:off x="8653975" y="4513389"/>
             <a:ext cx="584911" cy="276999"/>
           </a:xfrm>
           <a:prstGeom prst="rect">
@@ -9800,7 +9800,7 @@
         </p:nvSpPr>
         <p:spPr>
           <a:xfrm>
-            <a:off x="6357003" y="4059189"/>
+            <a:off x="6357003" y="4513389"/>
             <a:ext cx="584911" cy="276999"/>
           </a:xfrm>
           <a:prstGeom prst="rect">
@@ -9855,7 +9855,7 @@
         </p:blipFill>
         <p:spPr bwMode="auto">
           <a:xfrm>
-            <a:off x="11578407" y="4055636"/>
+            <a:off x="11578407" y="4509836"/>
             <a:ext cx="260064" cy="260064"/>
           </a:xfrm>
           <a:prstGeom prst="rect">
@@ -9902,7 +9902,7 @@
         </p:blipFill>
         <p:spPr bwMode="auto">
           <a:xfrm>
-            <a:off x="11257969" y="4051753"/>
+            <a:off x="11257969" y="4505953"/>
             <a:ext cx="260064" cy="260064"/>
           </a:xfrm>
           <a:prstGeom prst="rect">
@@ -9949,7 +9949,7 @@
         </p:blipFill>
         <p:spPr bwMode="auto">
           <a:xfrm>
-            <a:off x="10920596" y="4055636"/>
+            <a:off x="10920596" y="4509836"/>
             <a:ext cx="276999" cy="276999"/>
           </a:xfrm>
           <a:prstGeom prst="rect">
@@ -9981,7 +9981,7 @@
         </p:nvSpPr>
         <p:spPr>
           <a:xfrm>
-            <a:off x="1646299" y="4827436"/>
+            <a:off x="1646299" y="5281636"/>
             <a:ext cx="1350809" cy="276999"/>
           </a:xfrm>
           <a:prstGeom prst="rect">
@@ -10035,7 +10035,7 @@
         </p:blipFill>
         <p:spPr>
           <a:xfrm>
-            <a:off x="960099" y="4735104"/>
+            <a:off x="960099" y="5189304"/>
             <a:ext cx="461665" cy="461665"/>
           </a:xfrm>
           <a:prstGeom prst="roundRect">
@@ -10059,7 +10059,7 @@
         </p:nvSpPr>
         <p:spPr>
           <a:xfrm>
-            <a:off x="4229181" y="4827436"/>
+            <a:off x="4229181" y="5281636"/>
             <a:ext cx="637156" cy="276999"/>
           </a:xfrm>
           <a:prstGeom prst="rect">
@@ -10099,7 +10099,7 @@
         </p:nvSpPr>
         <p:spPr>
           <a:xfrm>
-            <a:off x="8653975" y="4827436"/>
+            <a:off x="8653975" y="5281636"/>
             <a:ext cx="584911" cy="276999"/>
           </a:xfrm>
           <a:prstGeom prst="rect">
@@ -10139,7 +10139,7 @@
         </p:nvSpPr>
         <p:spPr>
           <a:xfrm>
-            <a:off x="6357003" y="4827436"/>
+            <a:off x="6357003" y="5281636"/>
             <a:ext cx="584911" cy="276999"/>
           </a:xfrm>
           <a:prstGeom prst="rect">
@@ -10194,7 +10194,7 @@
         </p:blipFill>
         <p:spPr bwMode="auto">
           <a:xfrm>
-            <a:off x="11578407" y="4823883"/>
+            <a:off x="11578407" y="5278083"/>
             <a:ext cx="260064" cy="260064"/>
           </a:xfrm>
           <a:prstGeom prst="rect">
@@ -10241,7 +10241,7 @@
         </p:blipFill>
         <p:spPr bwMode="auto">
           <a:xfrm>
-            <a:off x="11257969" y="4820000"/>
+            <a:off x="11257969" y="5274200"/>
             <a:ext cx="260064" cy="260064"/>
           </a:xfrm>
           <a:prstGeom prst="rect">
@@ -10288,7 +10288,7 @@
         </p:blipFill>
         <p:spPr bwMode="auto">
           <a:xfrm>
-            <a:off x="10920596" y="4823883"/>
+            <a:off x="10920596" y="5278083"/>
             <a:ext cx="276999" cy="276999"/>
           </a:xfrm>
           <a:prstGeom prst="rect">
@@ -10320,7 +10320,7 @@
         </p:nvSpPr>
         <p:spPr>
           <a:xfrm>
-            <a:off x="1646299" y="5592129"/>
+            <a:off x="1646299" y="6046329"/>
             <a:ext cx="1350809" cy="276999"/>
           </a:xfrm>
           <a:prstGeom prst="rect">
@@ -10374,7 +10374,7 @@
         </p:blipFill>
         <p:spPr>
           <a:xfrm>
-            <a:off x="960099" y="5499797"/>
+            <a:off x="960099" y="5953997"/>
             <a:ext cx="461665" cy="461665"/>
           </a:xfrm>
           <a:prstGeom prst="roundRect">
@@ -10398,7 +10398,7 @@
         </p:nvSpPr>
         <p:spPr>
           <a:xfrm>
-            <a:off x="4229181" y="5592129"/>
+            <a:off x="4229181" y="6046329"/>
             <a:ext cx="637156" cy="276999"/>
           </a:xfrm>
           <a:prstGeom prst="rect">
@@ -10438,7 +10438,7 @@
         </p:nvSpPr>
         <p:spPr>
           <a:xfrm>
-            <a:off x="8653975" y="5592129"/>
+            <a:off x="8653975" y="6046329"/>
             <a:ext cx="584911" cy="276999"/>
           </a:xfrm>
           <a:prstGeom prst="rect">
@@ -10478,7 +10478,7 @@
         </p:nvSpPr>
         <p:spPr>
           <a:xfrm>
-            <a:off x="6357003" y="5592129"/>
+            <a:off x="6357003" y="6046329"/>
             <a:ext cx="584911" cy="276999"/>
           </a:xfrm>
           <a:prstGeom prst="rect">
@@ -10533,7 +10533,7 @@
         </p:blipFill>
         <p:spPr bwMode="auto">
           <a:xfrm>
-            <a:off x="11578407" y="5588576"/>
+            <a:off x="11578407" y="6042776"/>
             <a:ext cx="260064" cy="260064"/>
           </a:xfrm>
           <a:prstGeom prst="rect">
@@ -10580,7 +10580,7 @@
         </p:blipFill>
         <p:spPr bwMode="auto">
           <a:xfrm>
-            <a:off x="11257969" y="5584693"/>
+            <a:off x="11257969" y="6038893"/>
             <a:ext cx="260064" cy="260064"/>
           </a:xfrm>
           <a:prstGeom prst="rect">
@@ -10627,7 +10627,7 @@
         </p:blipFill>
         <p:spPr bwMode="auto">
           <a:xfrm>
-            <a:off x="10920596" y="5588576"/>
+            <a:off x="10920596" y="6042776"/>
             <a:ext cx="276999" cy="276999"/>
           </a:xfrm>
           <a:prstGeom prst="rect">
@@ -10645,210 +10645,12 @@
           </a:extLst>
         </p:spPr>
       </p:pic>
-      <p:sp>
-        <p:nvSpPr>
-          <p:cNvPr id="4122" name="TextBox 5126">
-            <a:extLst>
-              <a:ext uri="{FF2B5EF4-FFF2-40B4-BE49-F238E27FC236}">
-                <a16:creationId xmlns:a16="http://schemas.microsoft.com/office/drawing/2014/main" id="{205650DD-3B1C-4D1A-0519-6AE835FF3136}"/>
-              </a:ext>
-            </a:extLst>
-          </p:cNvPr>
-          <p:cNvSpPr txBox="1"/>
-          <p:nvPr/>
-        </p:nvSpPr>
-        <p:spPr>
-          <a:xfrm>
-            <a:off x="1646299" y="6356981"/>
-            <a:ext cx="1350809" cy="276999"/>
-          </a:xfrm>
-          <a:prstGeom prst="rect">
-            <a:avLst/>
-          </a:prstGeom>
-          <a:noFill/>
-        </p:spPr>
-        <p:txBody>
-          <a:bodyPr wrap="square" rtlCol="0">
-            <a:spAutoFit/>
-          </a:bodyPr>
-          <a:lstStyle/>
-          <a:p>
-            <a:r>
-              <a:rPr lang="en-US" sz="1200" b="1" noProof="0" dirty="0">
-                <a:solidFill>
-                  <a:schemeClr val="bg1"/>
-                </a:solidFill>
-                <a:latin typeface="Montserrat" panose="00000500000000000000" pitchFamily="2" charset="0"/>
-              </a:rPr>
-              <a:t>Sonic Blaster</a:t>
-            </a:r>
-          </a:p>
-        </p:txBody>
-      </p:sp>
       <p:pic>
         <p:nvPicPr>
-          <p:cNvPr id="4123" name="Picture 5128" descr="A purple and white background with text&#10;&#10;AI-generated content may be incorrect.">
-            <a:extLst>
-              <a:ext uri="{FF2B5EF4-FFF2-40B4-BE49-F238E27FC236}">
-                <a16:creationId xmlns:a16="http://schemas.microsoft.com/office/drawing/2014/main" id="{2078ABC0-0787-BACA-A8B4-5DDDBD5C8D39}"/>
-              </a:ext>
-            </a:extLst>
-          </p:cNvPr>
-          <p:cNvPicPr>
-            <a:picLocks noChangeAspect="1"/>
-          </p:cNvPicPr>
-          <p:nvPr/>
-        </p:nvPicPr>
-        <p:blipFill>
-          <a:blip r:embed="rId12">
-            <a:extLst>
-              <a:ext uri="{28A0092B-C50C-407E-A947-70E740481C1C}">
-                <a14:useLocalDpi xmlns:a14="http://schemas.microsoft.com/office/drawing/2010/main" val="0"/>
-              </a:ext>
-            </a:extLst>
-          </a:blip>
-          <a:stretch>
-            <a:fillRect/>
-          </a:stretch>
-        </p:blipFill>
-        <p:spPr>
-          <a:xfrm>
-            <a:off x="960099" y="6264649"/>
-            <a:ext cx="461665" cy="461665"/>
-          </a:xfrm>
-          <a:prstGeom prst="roundRect">
-            <a:avLst>
-              <a:gd name="adj" fmla="val 4006"/>
-            </a:avLst>
-          </a:prstGeom>
-        </p:spPr>
-      </p:pic>
-      <p:sp>
-        <p:nvSpPr>
-          <p:cNvPr id="4124" name="TextBox 5130">
-            <a:extLst>
-              <a:ext uri="{FF2B5EF4-FFF2-40B4-BE49-F238E27FC236}">
-                <a16:creationId xmlns:a16="http://schemas.microsoft.com/office/drawing/2014/main" id="{3E1D4AC9-3087-FA6C-E262-9D589CBC5FA9}"/>
-              </a:ext>
-            </a:extLst>
-          </p:cNvPr>
-          <p:cNvSpPr txBox="1"/>
-          <p:nvPr/>
-        </p:nvSpPr>
-        <p:spPr>
-          <a:xfrm>
-            <a:off x="4229181" y="6356981"/>
-            <a:ext cx="637156" cy="276999"/>
-          </a:xfrm>
-          <a:prstGeom prst="rect">
-            <a:avLst/>
-          </a:prstGeom>
-          <a:noFill/>
-        </p:spPr>
-        <p:txBody>
-          <a:bodyPr wrap="square" rtlCol="0">
-            <a:spAutoFit/>
-          </a:bodyPr>
-          <a:lstStyle/>
-          <a:p>
-            <a:r>
-              <a:rPr lang="en-US" sz="1200" noProof="0" dirty="0">
-                <a:solidFill>
-                  <a:schemeClr val="bg1"/>
-                </a:solidFill>
-                <a:latin typeface="Montserrat" panose="00000500000000000000" pitchFamily="2" charset="0"/>
-              </a:rPr>
-              <a:t>F-777</a:t>
-            </a:r>
-          </a:p>
-        </p:txBody>
-      </p:sp>
-      <p:sp>
-        <p:nvSpPr>
-          <p:cNvPr id="4125" name="TextBox 5131">
-            <a:extLst>
-              <a:ext uri="{FF2B5EF4-FFF2-40B4-BE49-F238E27FC236}">
-                <a16:creationId xmlns:a16="http://schemas.microsoft.com/office/drawing/2014/main" id="{11D82FD0-D8EC-15C7-41A9-F2E8E5775339}"/>
-              </a:ext>
-            </a:extLst>
-          </p:cNvPr>
-          <p:cNvSpPr txBox="1"/>
-          <p:nvPr/>
-        </p:nvSpPr>
-        <p:spPr>
-          <a:xfrm>
-            <a:off x="8653975" y="6356981"/>
-            <a:ext cx="584911" cy="276999"/>
-          </a:xfrm>
-          <a:prstGeom prst="rect">
-            <a:avLst/>
-          </a:prstGeom>
-          <a:noFill/>
-        </p:spPr>
-        <p:txBody>
-          <a:bodyPr wrap="square" rtlCol="0">
-            <a:spAutoFit/>
-          </a:bodyPr>
-          <a:lstStyle/>
-          <a:p>
-            <a:r>
-              <a:rPr lang="en-US" sz="1200" noProof="0" dirty="0">
-                <a:solidFill>
-                  <a:schemeClr val="bg1"/>
-                </a:solidFill>
-                <a:latin typeface="Montserrat" panose="00000500000000000000" pitchFamily="2" charset="0"/>
-              </a:rPr>
-              <a:t> 3:02</a:t>
-            </a:r>
-          </a:p>
-        </p:txBody>
-      </p:sp>
-      <p:sp>
-        <p:nvSpPr>
-          <p:cNvPr id="4126" name="TextBox 5132">
-            <a:extLst>
-              <a:ext uri="{FF2B5EF4-FFF2-40B4-BE49-F238E27FC236}">
-                <a16:creationId xmlns:a16="http://schemas.microsoft.com/office/drawing/2014/main" id="{98200332-43E2-16AE-F67D-21DA13705F05}"/>
-              </a:ext>
-            </a:extLst>
-          </p:cNvPr>
-          <p:cNvSpPr txBox="1"/>
-          <p:nvPr/>
-        </p:nvSpPr>
-        <p:spPr>
-          <a:xfrm>
-            <a:off x="6357003" y="6356981"/>
-            <a:ext cx="584911" cy="276999"/>
-          </a:xfrm>
-          <a:prstGeom prst="rect">
-            <a:avLst/>
-          </a:prstGeom>
-          <a:noFill/>
-        </p:spPr>
-        <p:txBody>
-          <a:bodyPr wrap="square" rtlCol="0">
-            <a:spAutoFit/>
-          </a:bodyPr>
-          <a:lstStyle/>
-          <a:p>
-            <a:r>
-              <a:rPr lang="en-US" sz="1200" noProof="0" dirty="0">
-                <a:solidFill>
-                  <a:schemeClr val="bg1"/>
-                </a:solidFill>
-                <a:latin typeface="Montserrat" panose="00000500000000000000" pitchFamily="2" charset="0"/>
-              </a:rPr>
-              <a:t> 2014</a:t>
-            </a:r>
-          </a:p>
-        </p:txBody>
-      </p:sp>
-      <p:pic>
-        <p:nvPicPr>
-          <p:cNvPr id="4127" name="Picture 4">
-            <a:extLst>
-              <a:ext uri="{FF2B5EF4-FFF2-40B4-BE49-F238E27FC236}">
-                <a16:creationId xmlns:a16="http://schemas.microsoft.com/office/drawing/2014/main" id="{F1C0CD75-D3E4-5B1D-F46A-D4B7A40D816B}"/>
+          <p:cNvPr id="4139" name="Picture 2">
+            <a:extLst>
+              <a:ext uri="{FF2B5EF4-FFF2-40B4-BE49-F238E27FC236}">
+                <a16:creationId xmlns:a16="http://schemas.microsoft.com/office/drawing/2014/main" id="{08CB738D-AC41-B2F4-01D3-DB00FA4D229A}"/>
               </a:ext>
             </a:extLst>
           </p:cNvPr>
@@ -10858,7 +10660,7 @@
           <p:nvPr/>
         </p:nvPicPr>
         <p:blipFill>
-          <a:blip r:embed="rId13">
+          <a:blip r:embed="rId16">
             <a:extLst>
               <a:ext uri="{28A0092B-C50C-407E-A947-70E740481C1C}">
                 <a14:useLocalDpi xmlns:a14="http://schemas.microsoft.com/office/drawing/2010/main" val="0"/>
@@ -10872,8 +10674,8 @@
         </p:blipFill>
         <p:spPr bwMode="auto">
           <a:xfrm>
-            <a:off x="11578407" y="6353428"/>
-            <a:ext cx="260064" cy="260064"/>
+            <a:off x="10061094" y="3686079"/>
+            <a:ext cx="276998" cy="276998"/>
           </a:xfrm>
           <a:prstGeom prst="rect">
             <a:avLst/>
@@ -10892,10 +10694,10 @@
       </p:pic>
       <p:pic>
         <p:nvPicPr>
-          <p:cNvPr id="4128" name="Picture 6">
-            <a:extLst>
-              <a:ext uri="{FF2B5EF4-FFF2-40B4-BE49-F238E27FC236}">
-                <a16:creationId xmlns:a16="http://schemas.microsoft.com/office/drawing/2014/main" id="{46D0C8EC-45F9-8E0B-E0A5-877C4032B34C}"/>
+          <p:cNvPr id="4140" name="Picture 2">
+            <a:extLst>
+              <a:ext uri="{FF2B5EF4-FFF2-40B4-BE49-F238E27FC236}">
+                <a16:creationId xmlns:a16="http://schemas.microsoft.com/office/drawing/2014/main" id="{CE6334DE-FA4D-51C1-A5A9-2ADAC3F353BF}"/>
               </a:ext>
             </a:extLst>
           </p:cNvPr>
@@ -10905,7 +10707,7 @@
           <p:nvPr/>
         </p:nvPicPr>
         <p:blipFill>
-          <a:blip r:embed="rId14">
+          <a:blip r:embed="rId16">
             <a:extLst>
               <a:ext uri="{28A0092B-C50C-407E-A947-70E740481C1C}">
                 <a14:useLocalDpi xmlns:a14="http://schemas.microsoft.com/office/drawing/2010/main" val="0"/>
@@ -10919,8 +10721,8 @@
         </p:blipFill>
         <p:spPr bwMode="auto">
           <a:xfrm>
-            <a:off x="11257969" y="6349545"/>
-            <a:ext cx="260064" cy="260064"/>
+            <a:off x="10058817" y="4509837"/>
+            <a:ext cx="276998" cy="276998"/>
           </a:xfrm>
           <a:prstGeom prst="rect">
             <a:avLst/>
@@ -10939,10 +10741,10 @@
       </p:pic>
       <p:pic>
         <p:nvPicPr>
-          <p:cNvPr id="4129" name="Picture 8">
-            <a:extLst>
-              <a:ext uri="{FF2B5EF4-FFF2-40B4-BE49-F238E27FC236}">
-                <a16:creationId xmlns:a16="http://schemas.microsoft.com/office/drawing/2014/main" id="{AD4D4AFC-D890-037E-9017-DB687967B7E3}"/>
+          <p:cNvPr id="4141" name="Picture 2">
+            <a:extLst>
+              <a:ext uri="{FF2B5EF4-FFF2-40B4-BE49-F238E27FC236}">
+                <a16:creationId xmlns:a16="http://schemas.microsoft.com/office/drawing/2014/main" id="{A7488994-E4C8-BBDF-699D-DEC3E5FF3FBA}"/>
               </a:ext>
             </a:extLst>
           </p:cNvPr>
@@ -10952,7 +10754,7 @@
           <p:nvPr/>
         </p:nvPicPr>
         <p:blipFill>
-          <a:blip r:embed="rId15">
+          <a:blip r:embed="rId16">
             <a:extLst>
               <a:ext uri="{28A0092B-C50C-407E-A947-70E740481C1C}">
                 <a14:useLocalDpi xmlns:a14="http://schemas.microsoft.com/office/drawing/2010/main" val="0"/>
@@ -10966,8 +10768,8 @@
         </p:blipFill>
         <p:spPr bwMode="auto">
           <a:xfrm>
-            <a:off x="10920596" y="6353428"/>
-            <a:ext cx="276999" cy="276999"/>
+            <a:off x="10062644" y="5281636"/>
+            <a:ext cx="276998" cy="276998"/>
           </a:xfrm>
           <a:prstGeom prst="rect">
             <a:avLst/>
@@ -10986,10 +10788,10 @@
       </p:pic>
       <p:pic>
         <p:nvPicPr>
-          <p:cNvPr id="4139" name="Picture 2">
-            <a:extLst>
-              <a:ext uri="{FF2B5EF4-FFF2-40B4-BE49-F238E27FC236}">
-                <a16:creationId xmlns:a16="http://schemas.microsoft.com/office/drawing/2014/main" id="{08CB738D-AC41-B2F4-01D3-DB00FA4D229A}"/>
+          <p:cNvPr id="4142" name="Picture 2">
+            <a:extLst>
+              <a:ext uri="{FF2B5EF4-FFF2-40B4-BE49-F238E27FC236}">
+                <a16:creationId xmlns:a16="http://schemas.microsoft.com/office/drawing/2014/main" id="{03C6B177-EB55-C0E2-094A-52455ED77D31}"/>
               </a:ext>
             </a:extLst>
           </p:cNvPr>
@@ -11013,7 +10815,7 @@
         </p:blipFill>
         <p:spPr bwMode="auto">
           <a:xfrm>
-            <a:off x="10061094" y="3231879"/>
+            <a:off x="10074460" y="6025842"/>
             <a:ext cx="276998" cy="276998"/>
           </a:xfrm>
           <a:prstGeom prst="rect">
@@ -11031,12 +10833,158 @@
           </a:extLst>
         </p:spPr>
       </p:pic>
+      <p:sp>
+        <p:nvSpPr>
+          <p:cNvPr id="4150" name="Rectangle: Rounded Corners 12">
+            <a:extLst>
+              <a:ext uri="{FF2B5EF4-FFF2-40B4-BE49-F238E27FC236}">
+                <a16:creationId xmlns:a16="http://schemas.microsoft.com/office/drawing/2014/main" id="{D9E5CBA5-000D-99E7-C00E-B9C296EB08D6}"/>
+              </a:ext>
+            </a:extLst>
+          </p:cNvPr>
+          <p:cNvSpPr/>
+          <p:nvPr/>
+        </p:nvSpPr>
+        <p:spPr>
+          <a:xfrm>
+            <a:off x="806970" y="2777312"/>
+            <a:ext cx="11141190" cy="651845"/>
+          </a:xfrm>
+          <a:prstGeom prst="roundRect">
+            <a:avLst>
+              <a:gd name="adj" fmla="val 16052"/>
+            </a:avLst>
+          </a:prstGeom>
+          <a:solidFill>
+            <a:srgbClr val="002646"/>
+          </a:solidFill>
+          <a:ln>
+            <a:noFill/>
+          </a:ln>
+        </p:spPr>
+        <p:style>
+          <a:lnRef idx="2">
+            <a:schemeClr val="accent1">
+              <a:shade val="15000"/>
+            </a:schemeClr>
+          </a:lnRef>
+          <a:fillRef idx="1">
+            <a:schemeClr val="accent1"/>
+          </a:fillRef>
+          <a:effectRef idx="0">
+            <a:schemeClr val="accent1"/>
+          </a:effectRef>
+          <a:fontRef idx="minor">
+            <a:schemeClr val="lt1"/>
+          </a:fontRef>
+        </p:style>
+        <p:txBody>
+          <a:bodyPr rtlCol="0" anchor="ctr"/>
+          <a:lstStyle/>
+          <a:p>
+            <a:pPr algn="ctr"/>
+            <a:endParaRPr lang="en-US" noProof="0" dirty="0"/>
+          </a:p>
+        </p:txBody>
+      </p:sp>
+      <p:sp>
+        <p:nvSpPr>
+          <p:cNvPr id="4151" name="Textfeld 4150">
+            <a:extLst>
+              <a:ext uri="{FF2B5EF4-FFF2-40B4-BE49-F238E27FC236}">
+                <a16:creationId xmlns:a16="http://schemas.microsoft.com/office/drawing/2014/main" id="{D614D058-CC8D-F508-6C93-137D601B60AD}"/>
+              </a:ext>
+            </a:extLst>
+          </p:cNvPr>
+          <p:cNvSpPr txBox="1"/>
+          <p:nvPr/>
+        </p:nvSpPr>
+        <p:spPr>
+          <a:xfrm>
+            <a:off x="848268" y="2824517"/>
+            <a:ext cx="1148172" cy="261610"/>
+          </a:xfrm>
+          <a:prstGeom prst="rect">
+            <a:avLst/>
+          </a:prstGeom>
+          <a:noFill/>
+        </p:spPr>
+        <p:txBody>
+          <a:bodyPr wrap="square" rtlCol="0">
+            <a:spAutoFit/>
+          </a:bodyPr>
+          <a:lstStyle/>
+          <a:p>
+            <a:r>
+              <a:rPr lang="de-CH" sz="1100" dirty="0">
+                <a:solidFill>
+                  <a:schemeClr val="bg1"/>
+                </a:solidFill>
+                <a:latin typeface="Montserrat" pitchFamily="2" charset="0"/>
+              </a:rPr>
+              <a:t>By F-777</a:t>
+            </a:r>
+          </a:p>
+        </p:txBody>
+      </p:sp>
+      <p:sp>
+        <p:nvSpPr>
+          <p:cNvPr id="4152" name="Ellipse 4151">
+            <a:extLst>
+              <a:ext uri="{FF2B5EF4-FFF2-40B4-BE49-F238E27FC236}">
+                <a16:creationId xmlns:a16="http://schemas.microsoft.com/office/drawing/2014/main" id="{1E8DCBCD-82BC-D3B8-C366-68552F43D3C0}"/>
+              </a:ext>
+            </a:extLst>
+          </p:cNvPr>
+          <p:cNvSpPr/>
+          <p:nvPr/>
+        </p:nvSpPr>
+        <p:spPr>
+          <a:xfrm>
+            <a:off x="11306718" y="1988463"/>
+            <a:ext cx="641442" cy="641442"/>
+          </a:xfrm>
+          <a:prstGeom prst="ellipse">
+            <a:avLst/>
+          </a:prstGeom>
+          <a:solidFill>
+            <a:srgbClr val="2AB9D2"/>
+          </a:solidFill>
+          <a:ln>
+            <a:noFill/>
+          </a:ln>
+        </p:spPr>
+        <p:style>
+          <a:lnRef idx="2">
+            <a:schemeClr val="accent1">
+              <a:shade val="15000"/>
+            </a:schemeClr>
+          </a:lnRef>
+          <a:fillRef idx="1">
+            <a:schemeClr val="accent1"/>
+          </a:fillRef>
+          <a:effectRef idx="0">
+            <a:schemeClr val="accent1"/>
+          </a:effectRef>
+          <a:fontRef idx="minor">
+            <a:schemeClr val="lt1"/>
+          </a:fontRef>
+        </p:style>
+        <p:txBody>
+          <a:bodyPr rtlCol="0" anchor="ctr"/>
+          <a:lstStyle/>
+          <a:p>
+            <a:pPr algn="ctr"/>
+            <a:endParaRPr lang="de-CH"/>
+          </a:p>
+        </p:txBody>
+      </p:sp>
       <p:pic>
         <p:nvPicPr>
-          <p:cNvPr id="4140" name="Picture 2">
-            <a:extLst>
-              <a:ext uri="{FF2B5EF4-FFF2-40B4-BE49-F238E27FC236}">
-                <a16:creationId xmlns:a16="http://schemas.microsoft.com/office/drawing/2014/main" id="{CE6334DE-FA4D-51C1-A5A9-2ADAC3F353BF}"/>
+          <p:cNvPr id="4153" name="Picture 2">
+            <a:extLst>
+              <a:ext uri="{FF2B5EF4-FFF2-40B4-BE49-F238E27FC236}">
+                <a16:creationId xmlns:a16="http://schemas.microsoft.com/office/drawing/2014/main" id="{DEAFF357-1259-01CA-5960-D7CC52B48F26}"/>
               </a:ext>
             </a:extLst>
           </p:cNvPr>
@@ -11046,7 +10994,7 @@
           <p:nvPr/>
         </p:nvPicPr>
         <p:blipFill>
-          <a:blip r:embed="rId16">
+          <a:blip r:embed="rId17">
             <a:extLst>
               <a:ext uri="{28A0092B-C50C-407E-A947-70E740481C1C}">
                 <a14:useLocalDpi xmlns:a14="http://schemas.microsoft.com/office/drawing/2010/main" val="0"/>
@@ -11060,8 +11008,8 @@
         </p:blipFill>
         <p:spPr bwMode="auto">
           <a:xfrm>
-            <a:off x="10058817" y="4055637"/>
-            <a:ext cx="276998" cy="276998"/>
+            <a:off x="11406848" y="2079158"/>
+            <a:ext cx="461664" cy="461664"/>
           </a:xfrm>
           <a:prstGeom prst="rect">
             <a:avLst/>
@@ -11078,12 +11026,64 @@
           </a:extLst>
         </p:spPr>
       </p:pic>
+      <p:sp>
+        <p:nvSpPr>
+          <p:cNvPr id="4154" name="Ellipse 4153">
+            <a:extLst>
+              <a:ext uri="{FF2B5EF4-FFF2-40B4-BE49-F238E27FC236}">
+                <a16:creationId xmlns:a16="http://schemas.microsoft.com/office/drawing/2014/main" id="{C6191D4C-8499-5C97-1D38-DB8638CFC008}"/>
+              </a:ext>
+            </a:extLst>
+          </p:cNvPr>
+          <p:cNvSpPr/>
+          <p:nvPr/>
+        </p:nvSpPr>
+        <p:spPr>
+          <a:xfrm>
+            <a:off x="10552144" y="2001722"/>
+            <a:ext cx="641442" cy="641442"/>
+          </a:xfrm>
+          <a:prstGeom prst="ellipse">
+            <a:avLst/>
+          </a:prstGeom>
+          <a:noFill/>
+          <a:ln w="28575">
+            <a:solidFill>
+              <a:srgbClr val="2AB9D2"/>
+            </a:solidFill>
+          </a:ln>
+        </p:spPr>
+        <p:style>
+          <a:lnRef idx="2">
+            <a:schemeClr val="accent1">
+              <a:shade val="15000"/>
+            </a:schemeClr>
+          </a:lnRef>
+          <a:fillRef idx="1">
+            <a:schemeClr val="accent1"/>
+          </a:fillRef>
+          <a:effectRef idx="0">
+            <a:schemeClr val="accent1"/>
+          </a:effectRef>
+          <a:fontRef idx="minor">
+            <a:schemeClr val="lt1"/>
+          </a:fontRef>
+        </p:style>
+        <p:txBody>
+          <a:bodyPr rtlCol="0" anchor="ctr"/>
+          <a:lstStyle/>
+          <a:p>
+            <a:pPr algn="ctr"/>
+            <a:endParaRPr lang="de-CH"/>
+          </a:p>
+        </p:txBody>
+      </p:sp>
       <p:pic>
         <p:nvPicPr>
-          <p:cNvPr id="4141" name="Picture 2">
-            <a:extLst>
-              <a:ext uri="{FF2B5EF4-FFF2-40B4-BE49-F238E27FC236}">
-                <a16:creationId xmlns:a16="http://schemas.microsoft.com/office/drawing/2014/main" id="{A7488994-E4C8-BBDF-699D-DEC3E5FF3FBA}"/>
+          <p:cNvPr id="4155" name="Picture 4">
+            <a:extLst>
+              <a:ext uri="{FF2B5EF4-FFF2-40B4-BE49-F238E27FC236}">
+                <a16:creationId xmlns:a16="http://schemas.microsoft.com/office/drawing/2014/main" id="{C3CC271B-4EA4-E7BD-E7E8-092F7E1E60A5}"/>
               </a:ext>
             </a:extLst>
           </p:cNvPr>
@@ -11093,7 +11093,7 @@
           <p:nvPr/>
         </p:nvPicPr>
         <p:blipFill>
-          <a:blip r:embed="rId16">
+          <a:blip r:embed="rId18">
             <a:extLst>
               <a:ext uri="{28A0092B-C50C-407E-A947-70E740481C1C}">
                 <a14:useLocalDpi xmlns:a14="http://schemas.microsoft.com/office/drawing/2010/main" val="0"/>
@@ -11107,8 +11107,8 @@
         </p:blipFill>
         <p:spPr bwMode="auto">
           <a:xfrm>
-            <a:off x="10062644" y="4827436"/>
-            <a:ext cx="276998" cy="276998"/>
+            <a:off x="10663333" y="2112049"/>
+            <a:ext cx="421337" cy="421337"/>
           </a:xfrm>
           <a:prstGeom prst="rect">
             <a:avLst/>
@@ -11125,12 +11125,204 @@
           </a:extLst>
         </p:spPr>
       </p:pic>
+      <p:sp>
+        <p:nvSpPr>
+          <p:cNvPr id="2" name="Rectangle: Rounded Corners 27">
+            <a:extLst>
+              <a:ext uri="{FF2B5EF4-FFF2-40B4-BE49-F238E27FC236}">
+                <a16:creationId xmlns:a16="http://schemas.microsoft.com/office/drawing/2014/main" id="{BFB47327-9521-47DE-DF58-45E74D5E440F}"/>
+              </a:ext>
+            </a:extLst>
+          </p:cNvPr>
+          <p:cNvSpPr/>
+          <p:nvPr/>
+        </p:nvSpPr>
+        <p:spPr>
+          <a:xfrm>
+            <a:off x="806971" y="777494"/>
+            <a:ext cx="1015204" cy="410106"/>
+          </a:xfrm>
+          <a:prstGeom prst="roundRect">
+            <a:avLst/>
+          </a:prstGeom>
+          <a:solidFill>
+            <a:srgbClr val="2AB9D2"/>
+          </a:solidFill>
+          <a:ln>
+            <a:noFill/>
+          </a:ln>
+        </p:spPr>
+        <p:style>
+          <a:lnRef idx="2">
+            <a:schemeClr val="accent1">
+              <a:shade val="15000"/>
+            </a:schemeClr>
+          </a:lnRef>
+          <a:fillRef idx="1">
+            <a:schemeClr val="accent1"/>
+          </a:fillRef>
+          <a:effectRef idx="0">
+            <a:schemeClr val="accent1"/>
+          </a:effectRef>
+          <a:fontRef idx="minor">
+            <a:schemeClr val="lt1"/>
+          </a:fontRef>
+        </p:style>
+        <p:txBody>
+          <a:bodyPr rtlCol="0" anchor="ctr"/>
+          <a:lstStyle/>
+          <a:p>
+            <a:pPr algn="ctr"/>
+            <a:r>
+              <a:rPr lang="en-US" sz="1400" b="1" noProof="0" dirty="0">
+                <a:solidFill>
+                  <a:srgbClr val="00172B"/>
+                </a:solidFill>
+                <a:latin typeface="Montserrat" panose="00000500000000000000" pitchFamily="2" charset="0"/>
+              </a:rPr>
+              <a:t>Back</a:t>
+            </a:r>
+            <a:r>
+              <a:rPr lang="en-US" b="1" noProof="0" dirty="0">
+                <a:solidFill>
+                  <a:srgbClr val="00172B"/>
+                </a:solidFill>
+                <a:latin typeface="Montserrat" panose="00000500000000000000" pitchFamily="2" charset="0"/>
+              </a:rPr>
+              <a:t> </a:t>
+            </a:r>
+          </a:p>
+        </p:txBody>
+      </p:sp>
+      <p:sp>
+        <p:nvSpPr>
+          <p:cNvPr id="3" name="Rectangle: Rounded Corners 27">
+            <a:extLst>
+              <a:ext uri="{FF2B5EF4-FFF2-40B4-BE49-F238E27FC236}">
+                <a16:creationId xmlns:a16="http://schemas.microsoft.com/office/drawing/2014/main" id="{C21B4A0B-DC27-4AD5-A338-44ACB03BD342}"/>
+              </a:ext>
+            </a:extLst>
+          </p:cNvPr>
+          <p:cNvSpPr/>
+          <p:nvPr/>
+        </p:nvSpPr>
+        <p:spPr>
+          <a:xfrm>
+            <a:off x="10972964" y="777494"/>
+            <a:ext cx="424887" cy="410106"/>
+          </a:xfrm>
+          <a:prstGeom prst="roundRect">
+            <a:avLst/>
+          </a:prstGeom>
+          <a:solidFill>
+            <a:srgbClr val="2AB9D2"/>
+          </a:solidFill>
+          <a:ln>
+            <a:noFill/>
+          </a:ln>
+        </p:spPr>
+        <p:style>
+          <a:lnRef idx="2">
+            <a:schemeClr val="accent1">
+              <a:shade val="15000"/>
+            </a:schemeClr>
+          </a:lnRef>
+          <a:fillRef idx="1">
+            <a:schemeClr val="accent1"/>
+          </a:fillRef>
+          <a:effectRef idx="0">
+            <a:schemeClr val="accent1"/>
+          </a:effectRef>
+          <a:fontRef idx="minor">
+            <a:schemeClr val="lt1"/>
+          </a:fontRef>
+        </p:style>
+        <p:txBody>
+          <a:bodyPr rtlCol="0" anchor="ctr"/>
+          <a:lstStyle/>
+          <a:p>
+            <a:pPr algn="ctr"/>
+            <a:r>
+              <a:rPr lang="en-US" sz="1400" b="1" noProof="0" dirty="0">
+                <a:solidFill>
+                  <a:srgbClr val="00172B"/>
+                </a:solidFill>
+                <a:latin typeface="Montserrat" panose="00000500000000000000" pitchFamily="2" charset="0"/>
+              </a:rPr>
+              <a:t>+</a:t>
+            </a:r>
+            <a:endParaRPr lang="en-US" b="1" noProof="0" dirty="0">
+              <a:solidFill>
+                <a:srgbClr val="00172B"/>
+              </a:solidFill>
+              <a:latin typeface="Montserrat" panose="00000500000000000000" pitchFamily="2" charset="0"/>
+            </a:endParaRPr>
+          </a:p>
+        </p:txBody>
+      </p:sp>
+      <p:sp>
+        <p:nvSpPr>
+          <p:cNvPr id="7" name="Rectangle: Rounded Corners 27">
+            <a:extLst>
+              <a:ext uri="{FF2B5EF4-FFF2-40B4-BE49-F238E27FC236}">
+                <a16:creationId xmlns:a16="http://schemas.microsoft.com/office/drawing/2014/main" id="{55683172-2A61-9AE1-CC87-78F1C1A2193A}"/>
+              </a:ext>
+            </a:extLst>
+          </p:cNvPr>
+          <p:cNvSpPr/>
+          <p:nvPr/>
+        </p:nvSpPr>
+        <p:spPr>
+          <a:xfrm>
+            <a:off x="11518033" y="783218"/>
+            <a:ext cx="424887" cy="410106"/>
+          </a:xfrm>
+          <a:prstGeom prst="roundRect">
+            <a:avLst/>
+          </a:prstGeom>
+          <a:solidFill>
+            <a:srgbClr val="2AB9D2"/>
+          </a:solidFill>
+          <a:ln>
+            <a:noFill/>
+          </a:ln>
+        </p:spPr>
+        <p:style>
+          <a:lnRef idx="2">
+            <a:schemeClr val="accent1">
+              <a:shade val="15000"/>
+            </a:schemeClr>
+          </a:lnRef>
+          <a:fillRef idx="1">
+            <a:schemeClr val="accent1"/>
+          </a:fillRef>
+          <a:effectRef idx="0">
+            <a:schemeClr val="accent1"/>
+          </a:effectRef>
+          <a:fontRef idx="minor">
+            <a:schemeClr val="lt1"/>
+          </a:fontRef>
+        </p:style>
+        <p:txBody>
+          <a:bodyPr rtlCol="0" anchor="ctr"/>
+          <a:lstStyle/>
+          <a:p>
+            <a:pPr algn="ctr"/>
+            <a:endParaRPr lang="en-US" b="1" noProof="0" dirty="0">
+              <a:solidFill>
+                <a:srgbClr val="00172B"/>
+              </a:solidFill>
+              <a:latin typeface="Montserrat" panose="00000500000000000000" pitchFamily="2" charset="0"/>
+            </a:endParaRPr>
+          </a:p>
+        </p:txBody>
+      </p:sp>
       <p:pic>
         <p:nvPicPr>
-          <p:cNvPr id="4142" name="Picture 2">
-            <a:extLst>
-              <a:ext uri="{FF2B5EF4-FFF2-40B4-BE49-F238E27FC236}">
-                <a16:creationId xmlns:a16="http://schemas.microsoft.com/office/drawing/2014/main" id="{03C6B177-EB55-C0E2-094A-52455ED77D31}"/>
+          <p:cNvPr id="10" name="Picture 6">
+            <a:extLst>
+              <a:ext uri="{FF2B5EF4-FFF2-40B4-BE49-F238E27FC236}">
+                <a16:creationId xmlns:a16="http://schemas.microsoft.com/office/drawing/2014/main" id="{BBBE41F0-CFA3-2A03-75B8-D5AF8F01F1BA}"/>
               </a:ext>
             </a:extLst>
           </p:cNvPr>
@@ -11140,7 +11332,7 @@
           <p:nvPr/>
         </p:nvPicPr>
         <p:blipFill>
-          <a:blip r:embed="rId16">
+          <a:blip r:embed="rId14">
             <a:extLst>
               <a:ext uri="{28A0092B-C50C-407E-A947-70E740481C1C}">
                 <a14:useLocalDpi xmlns:a14="http://schemas.microsoft.com/office/drawing/2010/main" val="0"/>
@@ -11154,347 +11346,8 @@
         </p:blipFill>
         <p:spPr bwMode="auto">
           <a:xfrm>
-            <a:off x="10074460" y="5571642"/>
-            <a:ext cx="276998" cy="276998"/>
-          </a:xfrm>
-          <a:prstGeom prst="rect">
-            <a:avLst/>
-          </a:prstGeom>
-          <a:noFill/>
-          <a:extLst>
-            <a:ext uri="{909E8E84-426E-40DD-AFC4-6F175D3DCCD1}">
-              <a14:hiddenFill xmlns:a14="http://schemas.microsoft.com/office/drawing/2010/main">
-                <a:solidFill>
-                  <a:srgbClr val="FFFFFF"/>
-                </a:solidFill>
-              </a14:hiddenFill>
-            </a:ext>
-          </a:extLst>
-        </p:spPr>
-      </p:pic>
-      <p:pic>
-        <p:nvPicPr>
-          <p:cNvPr id="4143" name="Picture 2">
-            <a:extLst>
-              <a:ext uri="{FF2B5EF4-FFF2-40B4-BE49-F238E27FC236}">
-                <a16:creationId xmlns:a16="http://schemas.microsoft.com/office/drawing/2014/main" id="{D84845EA-6962-EF27-D4FA-E32926EB60C0}"/>
-              </a:ext>
-            </a:extLst>
-          </p:cNvPr>
-          <p:cNvPicPr>
-            <a:picLocks noChangeAspect="1" noChangeArrowheads="1"/>
-          </p:cNvPicPr>
-          <p:nvPr/>
-        </p:nvPicPr>
-        <p:blipFill>
-          <a:blip r:embed="rId16">
-            <a:extLst>
-              <a:ext uri="{28A0092B-C50C-407E-A947-70E740481C1C}">
-                <a14:useLocalDpi xmlns:a14="http://schemas.microsoft.com/office/drawing/2010/main" val="0"/>
-              </a:ext>
-            </a:extLst>
-          </a:blip>
-          <a:srcRect/>
-          <a:stretch>
-            <a:fillRect/>
-          </a:stretch>
-        </p:blipFill>
-        <p:spPr bwMode="auto">
-          <a:xfrm>
-            <a:off x="10089314" y="6362343"/>
-            <a:ext cx="276998" cy="276998"/>
-          </a:xfrm>
-          <a:prstGeom prst="rect">
-            <a:avLst/>
-          </a:prstGeom>
-          <a:noFill/>
-          <a:extLst>
-            <a:ext uri="{909E8E84-426E-40DD-AFC4-6F175D3DCCD1}">
-              <a14:hiddenFill xmlns:a14="http://schemas.microsoft.com/office/drawing/2010/main">
-                <a:solidFill>
-                  <a:srgbClr val="FFFFFF"/>
-                </a:solidFill>
-              </a14:hiddenFill>
-            </a:ext>
-          </a:extLst>
-        </p:spPr>
-      </p:pic>
-      <p:sp>
-        <p:nvSpPr>
-          <p:cNvPr id="4150" name="Rectangle: Rounded Corners 12">
-            <a:extLst>
-              <a:ext uri="{FF2B5EF4-FFF2-40B4-BE49-F238E27FC236}">
-                <a16:creationId xmlns:a16="http://schemas.microsoft.com/office/drawing/2014/main" id="{D9E5CBA5-000D-99E7-C00E-B9C296EB08D6}"/>
-              </a:ext>
-            </a:extLst>
-          </p:cNvPr>
-          <p:cNvSpPr/>
-          <p:nvPr/>
-        </p:nvSpPr>
-        <p:spPr>
-          <a:xfrm>
-            <a:off x="806970" y="2323112"/>
-            <a:ext cx="11141190" cy="651845"/>
-          </a:xfrm>
-          <a:prstGeom prst="roundRect">
-            <a:avLst>
-              <a:gd name="adj" fmla="val 16052"/>
-            </a:avLst>
-          </a:prstGeom>
-          <a:solidFill>
-            <a:srgbClr val="002646"/>
-          </a:solidFill>
-          <a:ln>
-            <a:noFill/>
-          </a:ln>
-        </p:spPr>
-        <p:style>
-          <a:lnRef idx="2">
-            <a:schemeClr val="accent1">
-              <a:shade val="15000"/>
-            </a:schemeClr>
-          </a:lnRef>
-          <a:fillRef idx="1">
-            <a:schemeClr val="accent1"/>
-          </a:fillRef>
-          <a:effectRef idx="0">
-            <a:schemeClr val="accent1"/>
-          </a:effectRef>
-          <a:fontRef idx="minor">
-            <a:schemeClr val="lt1"/>
-          </a:fontRef>
-        </p:style>
-        <p:txBody>
-          <a:bodyPr rtlCol="0" anchor="ctr"/>
-          <a:lstStyle/>
-          <a:p>
-            <a:pPr algn="ctr"/>
-            <a:endParaRPr lang="en-US" noProof="0" dirty="0"/>
-          </a:p>
-        </p:txBody>
-      </p:sp>
-      <p:sp>
-        <p:nvSpPr>
-          <p:cNvPr id="4151" name="Textfeld 4150">
-            <a:extLst>
-              <a:ext uri="{FF2B5EF4-FFF2-40B4-BE49-F238E27FC236}">
-                <a16:creationId xmlns:a16="http://schemas.microsoft.com/office/drawing/2014/main" id="{D614D058-CC8D-F508-6C93-137D601B60AD}"/>
-              </a:ext>
-            </a:extLst>
-          </p:cNvPr>
-          <p:cNvSpPr txBox="1"/>
-          <p:nvPr/>
-        </p:nvSpPr>
-        <p:spPr>
-          <a:xfrm>
-            <a:off x="848268" y="2370317"/>
-            <a:ext cx="1148172" cy="261610"/>
-          </a:xfrm>
-          <a:prstGeom prst="rect">
-            <a:avLst/>
-          </a:prstGeom>
-          <a:noFill/>
-        </p:spPr>
-        <p:txBody>
-          <a:bodyPr wrap="square" rtlCol="0">
-            <a:spAutoFit/>
-          </a:bodyPr>
-          <a:lstStyle/>
-          <a:p>
-            <a:r>
-              <a:rPr lang="de-CH" sz="1100" dirty="0">
-                <a:solidFill>
-                  <a:schemeClr val="bg1"/>
-                </a:solidFill>
-                <a:latin typeface="Montserrat" pitchFamily="2" charset="0"/>
-              </a:rPr>
-              <a:t>By F-777</a:t>
-            </a:r>
-          </a:p>
-        </p:txBody>
-      </p:sp>
-      <p:sp>
-        <p:nvSpPr>
-          <p:cNvPr id="4152" name="Ellipse 4151">
-            <a:extLst>
-              <a:ext uri="{FF2B5EF4-FFF2-40B4-BE49-F238E27FC236}">
-                <a16:creationId xmlns:a16="http://schemas.microsoft.com/office/drawing/2014/main" id="{1E8DCBCD-82BC-D3B8-C366-68552F43D3C0}"/>
-              </a:ext>
-            </a:extLst>
-          </p:cNvPr>
-          <p:cNvSpPr/>
-          <p:nvPr/>
-        </p:nvSpPr>
-        <p:spPr>
-          <a:xfrm>
-            <a:off x="11306718" y="1534263"/>
-            <a:ext cx="641442" cy="641442"/>
-          </a:xfrm>
-          <a:prstGeom prst="ellipse">
-            <a:avLst/>
-          </a:prstGeom>
-          <a:solidFill>
-            <a:srgbClr val="2AB9D2"/>
-          </a:solidFill>
-          <a:ln>
-            <a:noFill/>
-          </a:ln>
-        </p:spPr>
-        <p:style>
-          <a:lnRef idx="2">
-            <a:schemeClr val="accent1">
-              <a:shade val="15000"/>
-            </a:schemeClr>
-          </a:lnRef>
-          <a:fillRef idx="1">
-            <a:schemeClr val="accent1"/>
-          </a:fillRef>
-          <a:effectRef idx="0">
-            <a:schemeClr val="accent1"/>
-          </a:effectRef>
-          <a:fontRef idx="minor">
-            <a:schemeClr val="lt1"/>
-          </a:fontRef>
-        </p:style>
-        <p:txBody>
-          <a:bodyPr rtlCol="0" anchor="ctr"/>
-          <a:lstStyle/>
-          <a:p>
-            <a:pPr algn="ctr"/>
-            <a:endParaRPr lang="de-CH"/>
-          </a:p>
-        </p:txBody>
-      </p:sp>
-      <p:pic>
-        <p:nvPicPr>
-          <p:cNvPr id="4153" name="Picture 2">
-            <a:extLst>
-              <a:ext uri="{FF2B5EF4-FFF2-40B4-BE49-F238E27FC236}">
-                <a16:creationId xmlns:a16="http://schemas.microsoft.com/office/drawing/2014/main" id="{DEAFF357-1259-01CA-5960-D7CC52B48F26}"/>
-              </a:ext>
-            </a:extLst>
-          </p:cNvPr>
-          <p:cNvPicPr>
-            <a:picLocks noChangeAspect="1" noChangeArrowheads="1"/>
-          </p:cNvPicPr>
-          <p:nvPr/>
-        </p:nvPicPr>
-        <p:blipFill>
-          <a:blip r:embed="rId17">
-            <a:extLst>
-              <a:ext uri="{28A0092B-C50C-407E-A947-70E740481C1C}">
-                <a14:useLocalDpi xmlns:a14="http://schemas.microsoft.com/office/drawing/2010/main" val="0"/>
-              </a:ext>
-            </a:extLst>
-          </a:blip>
-          <a:srcRect/>
-          <a:stretch>
-            <a:fillRect/>
-          </a:stretch>
-        </p:blipFill>
-        <p:spPr bwMode="auto">
-          <a:xfrm>
-            <a:off x="11406848" y="1624958"/>
-            <a:ext cx="461664" cy="461664"/>
-          </a:xfrm>
-          <a:prstGeom prst="rect">
-            <a:avLst/>
-          </a:prstGeom>
-          <a:noFill/>
-          <a:extLst>
-            <a:ext uri="{909E8E84-426E-40DD-AFC4-6F175D3DCCD1}">
-              <a14:hiddenFill xmlns:a14="http://schemas.microsoft.com/office/drawing/2010/main">
-                <a:solidFill>
-                  <a:srgbClr val="FFFFFF"/>
-                </a:solidFill>
-              </a14:hiddenFill>
-            </a:ext>
-          </a:extLst>
-        </p:spPr>
-      </p:pic>
-      <p:sp>
-        <p:nvSpPr>
-          <p:cNvPr id="4154" name="Ellipse 4153">
-            <a:extLst>
-              <a:ext uri="{FF2B5EF4-FFF2-40B4-BE49-F238E27FC236}">
-                <a16:creationId xmlns:a16="http://schemas.microsoft.com/office/drawing/2014/main" id="{C6191D4C-8499-5C97-1D38-DB8638CFC008}"/>
-              </a:ext>
-            </a:extLst>
-          </p:cNvPr>
-          <p:cNvSpPr/>
-          <p:nvPr/>
-        </p:nvSpPr>
-        <p:spPr>
-          <a:xfrm>
-            <a:off x="10552144" y="1547522"/>
-            <a:ext cx="641442" cy="641442"/>
-          </a:xfrm>
-          <a:prstGeom prst="ellipse">
-            <a:avLst/>
-          </a:prstGeom>
-          <a:noFill/>
-          <a:ln w="28575">
-            <a:solidFill>
-              <a:srgbClr val="2AB9D2"/>
-            </a:solidFill>
-          </a:ln>
-        </p:spPr>
-        <p:style>
-          <a:lnRef idx="2">
-            <a:schemeClr val="accent1">
-              <a:shade val="15000"/>
-            </a:schemeClr>
-          </a:lnRef>
-          <a:fillRef idx="1">
-            <a:schemeClr val="accent1"/>
-          </a:fillRef>
-          <a:effectRef idx="0">
-            <a:schemeClr val="accent1"/>
-          </a:effectRef>
-          <a:fontRef idx="minor">
-            <a:schemeClr val="lt1"/>
-          </a:fontRef>
-        </p:style>
-        <p:txBody>
-          <a:bodyPr rtlCol="0" anchor="ctr"/>
-          <a:lstStyle/>
-          <a:p>
-            <a:pPr algn="ctr"/>
-            <a:endParaRPr lang="de-CH"/>
-          </a:p>
-        </p:txBody>
-      </p:sp>
-      <p:pic>
-        <p:nvPicPr>
-          <p:cNvPr id="4155" name="Picture 4">
-            <a:extLst>
-              <a:ext uri="{FF2B5EF4-FFF2-40B4-BE49-F238E27FC236}">
-                <a16:creationId xmlns:a16="http://schemas.microsoft.com/office/drawing/2014/main" id="{C3CC271B-4EA4-E7BD-E7E8-092F7E1E60A5}"/>
-              </a:ext>
-            </a:extLst>
-          </p:cNvPr>
-          <p:cNvPicPr>
-            <a:picLocks noChangeAspect="1" noChangeArrowheads="1"/>
-          </p:cNvPicPr>
-          <p:nvPr/>
-        </p:nvPicPr>
-        <p:blipFill>
-          <a:blip r:embed="rId18">
-            <a:extLst>
-              <a:ext uri="{28A0092B-C50C-407E-A947-70E740481C1C}">
-                <a14:useLocalDpi xmlns:a14="http://schemas.microsoft.com/office/drawing/2010/main" val="0"/>
-              </a:ext>
-            </a:extLst>
-          </a:blip>
-          <a:srcRect/>
-          <a:stretch>
-            <a:fillRect/>
-          </a:stretch>
-        </p:blipFill>
-        <p:spPr bwMode="auto">
-          <a:xfrm>
-            <a:off x="10663333" y="1657849"/>
-            <a:ext cx="421337" cy="421337"/>
+            <a:off x="11600444" y="841677"/>
+            <a:ext cx="260064" cy="260064"/>
           </a:xfrm>
           <a:prstGeom prst="rect">
             <a:avLst/>

</xml_diff>

<commit_message>
Added an edit song page
</commit_message>
<xml_diff>
--- a/mockups/SonicWaveMockup.pptx
+++ b/mockups/SonicWaveMockup.pptx
@@ -222,7 +222,7 @@
           <a:p>
             <a:fld id="{0E757DC4-2315-4FE9-87C1-E5FAB21BBA1E}" type="datetimeFigureOut">
               <a:rPr lang="de-CH" smtClean="0"/>
-              <a:t>24.07.2025</a:t>
+              <a:t>31.07.2025</a:t>
             </a:fld>
             <a:endParaRPr lang="de-CH"/>
           </a:p>
@@ -2976,7 +2976,7 @@
           <a:p>
             <a:fld id="{8043C726-E4AC-4898-A7DA-106D25D4B538}" type="datetimeFigureOut">
               <a:rPr lang="de-CH" smtClean="0"/>
-              <a:t>24.07.2025</a:t>
+              <a:t>31.07.2025</a:t>
             </a:fld>
             <a:endParaRPr lang="de-CH"/>
           </a:p>
@@ -3176,7 +3176,7 @@
           <a:p>
             <a:fld id="{8043C726-E4AC-4898-A7DA-106D25D4B538}" type="datetimeFigureOut">
               <a:rPr lang="de-CH" smtClean="0"/>
-              <a:t>24.07.2025</a:t>
+              <a:t>31.07.2025</a:t>
             </a:fld>
             <a:endParaRPr lang="de-CH"/>
           </a:p>
@@ -3386,7 +3386,7 @@
           <a:p>
             <a:fld id="{8043C726-E4AC-4898-A7DA-106D25D4B538}" type="datetimeFigureOut">
               <a:rPr lang="de-CH" smtClean="0"/>
-              <a:t>24.07.2025</a:t>
+              <a:t>31.07.2025</a:t>
             </a:fld>
             <a:endParaRPr lang="de-CH"/>
           </a:p>
@@ -3586,7 +3586,7 @@
           <a:p>
             <a:fld id="{8043C726-E4AC-4898-A7DA-106D25D4B538}" type="datetimeFigureOut">
               <a:rPr lang="de-CH" smtClean="0"/>
-              <a:t>24.07.2025</a:t>
+              <a:t>31.07.2025</a:t>
             </a:fld>
             <a:endParaRPr lang="de-CH"/>
           </a:p>
@@ -3862,7 +3862,7 @@
           <a:p>
             <a:fld id="{8043C726-E4AC-4898-A7DA-106D25D4B538}" type="datetimeFigureOut">
               <a:rPr lang="de-CH" smtClean="0"/>
-              <a:t>24.07.2025</a:t>
+              <a:t>31.07.2025</a:t>
             </a:fld>
             <a:endParaRPr lang="de-CH"/>
           </a:p>
@@ -4130,7 +4130,7 @@
           <a:p>
             <a:fld id="{8043C726-E4AC-4898-A7DA-106D25D4B538}" type="datetimeFigureOut">
               <a:rPr lang="de-CH" smtClean="0"/>
-              <a:t>24.07.2025</a:t>
+              <a:t>31.07.2025</a:t>
             </a:fld>
             <a:endParaRPr lang="de-CH"/>
           </a:p>
@@ -4545,7 +4545,7 @@
           <a:p>
             <a:fld id="{8043C726-E4AC-4898-A7DA-106D25D4B538}" type="datetimeFigureOut">
               <a:rPr lang="de-CH" smtClean="0"/>
-              <a:t>24.07.2025</a:t>
+              <a:t>31.07.2025</a:t>
             </a:fld>
             <a:endParaRPr lang="de-CH"/>
           </a:p>
@@ -4687,7 +4687,7 @@
           <a:p>
             <a:fld id="{8043C726-E4AC-4898-A7DA-106D25D4B538}" type="datetimeFigureOut">
               <a:rPr lang="de-CH" smtClean="0"/>
-              <a:t>24.07.2025</a:t>
+              <a:t>31.07.2025</a:t>
             </a:fld>
             <a:endParaRPr lang="de-CH"/>
           </a:p>
@@ -4800,7 +4800,7 @@
           <a:p>
             <a:fld id="{8043C726-E4AC-4898-A7DA-106D25D4B538}" type="datetimeFigureOut">
               <a:rPr lang="de-CH" smtClean="0"/>
-              <a:t>24.07.2025</a:t>
+              <a:t>31.07.2025</a:t>
             </a:fld>
             <a:endParaRPr lang="de-CH"/>
           </a:p>
@@ -5113,7 +5113,7 @@
           <a:p>
             <a:fld id="{8043C726-E4AC-4898-A7DA-106D25D4B538}" type="datetimeFigureOut">
               <a:rPr lang="de-CH" smtClean="0"/>
-              <a:t>24.07.2025</a:t>
+              <a:t>31.07.2025</a:t>
             </a:fld>
             <a:endParaRPr lang="de-CH"/>
           </a:p>
@@ -5402,7 +5402,7 @@
           <a:p>
             <a:fld id="{8043C726-E4AC-4898-A7DA-106D25D4B538}" type="datetimeFigureOut">
               <a:rPr lang="de-CH" smtClean="0"/>
-              <a:t>24.07.2025</a:t>
+              <a:t>31.07.2025</a:t>
             </a:fld>
             <a:endParaRPr lang="de-CH"/>
           </a:p>
@@ -5645,7 +5645,7 @@
           <a:p>
             <a:fld id="{8043C726-E4AC-4898-A7DA-106D25D4B538}" type="datetimeFigureOut">
               <a:rPr lang="de-CH" smtClean="0"/>
-              <a:t>24.07.2025</a:t>
+              <a:t>31.07.2025</a:t>
             </a:fld>
             <a:endParaRPr lang="de-CH"/>
           </a:p>
@@ -50760,7 +50760,7 @@
             <a:pPr algn="ctr"/>
             <a:r>
               <a:rPr lang="en-US" noProof="0" dirty="0"/>
-              <a:t>§	</a:t>
+              <a:t>	</a:t>
             </a:r>
           </a:p>
         </p:txBody>
@@ -51543,8 +51543,8 @@
         </p:blipFill>
         <p:spPr>
           <a:xfrm>
-            <a:off x="862849" y="1426004"/>
-            <a:ext cx="5296651" cy="5296651"/>
+            <a:off x="9589135" y="1426005"/>
+            <a:ext cx="2414725" cy="2414725"/>
           </a:xfrm>
           <a:prstGeom prst="roundRect">
             <a:avLst>
@@ -51567,8 +51567,8 @@
         </p:nvSpPr>
         <p:spPr>
           <a:xfrm>
-            <a:off x="6346326" y="1733762"/>
-            <a:ext cx="5747195" cy="410105"/>
+            <a:off x="796024" y="1772821"/>
+            <a:ext cx="8626595" cy="410105"/>
           </a:xfrm>
           <a:prstGeom prst="roundRect">
             <a:avLst/>
@@ -51619,7 +51619,7 @@
         </p:nvSpPr>
         <p:spPr>
           <a:xfrm>
-            <a:off x="6333093" y="1420935"/>
+            <a:off x="782791" y="1459994"/>
             <a:ext cx="1124211" cy="276999"/>
           </a:xfrm>
           <a:prstGeom prst="rect">
@@ -51659,7 +51659,7 @@
         </p:nvSpPr>
         <p:spPr>
           <a:xfrm>
-            <a:off x="6346326" y="1800314"/>
+            <a:off x="796024" y="1839373"/>
             <a:ext cx="1654260" cy="276999"/>
           </a:xfrm>
           <a:prstGeom prst="rect">
@@ -51701,17 +51701,19 @@
         </p:nvSpPr>
         <p:spPr>
           <a:xfrm>
-            <a:off x="6359559" y="2597027"/>
-            <a:ext cx="5736182" cy="410105"/>
+            <a:off x="814128" y="4279936"/>
+            <a:ext cx="8608491" cy="561990"/>
           </a:xfrm>
           <a:prstGeom prst="roundRect">
-            <a:avLst/>
-          </a:prstGeom>
-          <a:solidFill>
-            <a:srgbClr val="002646"/>
-          </a:solidFill>
+            <a:avLst>
+              <a:gd name="adj" fmla="val 7468"/>
+            </a:avLst>
+          </a:prstGeom>
+          <a:noFill/>
           <a:ln>
-            <a:noFill/>
+            <a:solidFill>
+              <a:srgbClr val="002646"/>
+            </a:solidFill>
           </a:ln>
         </p:spPr>
         <p:style>
@@ -51753,7 +51755,7 @@
         </p:nvSpPr>
         <p:spPr>
           <a:xfrm>
-            <a:off x="6346326" y="2284200"/>
+            <a:off x="800895" y="3936385"/>
             <a:ext cx="1124211" cy="276999"/>
           </a:xfrm>
           <a:prstGeom prst="rect">
@@ -51781,48 +51783,6 @@
       </p:sp>
       <p:sp>
         <p:nvSpPr>
-          <p:cNvPr id="17" name="TextBox 16">
-            <a:extLst>
-              <a:ext uri="{FF2B5EF4-FFF2-40B4-BE49-F238E27FC236}">
-                <a16:creationId xmlns:a16="http://schemas.microsoft.com/office/drawing/2014/main" id="{4DE8445A-BFEB-FC85-648F-A3DA6E5D0076}"/>
-              </a:ext>
-            </a:extLst>
-          </p:cNvPr>
-          <p:cNvSpPr txBox="1"/>
-          <p:nvPr/>
-        </p:nvSpPr>
-        <p:spPr>
-          <a:xfrm>
-            <a:off x="6359559" y="2663579"/>
-            <a:ext cx="1654260" cy="276999"/>
-          </a:xfrm>
-          <a:prstGeom prst="rect">
-            <a:avLst/>
-          </a:prstGeom>
-          <a:noFill/>
-        </p:spPr>
-        <p:txBody>
-          <a:bodyPr wrap="square" rtlCol="0">
-            <a:spAutoFit/>
-          </a:bodyPr>
-          <a:lstStyle/>
-          <a:p>
-            <a:r>
-              <a:rPr lang="en-US" sz="1200" noProof="0" dirty="0">
-                <a:solidFill>
-                  <a:schemeClr val="bg1">
-                    <a:lumMod val="65000"/>
-                  </a:schemeClr>
-                </a:solidFill>
-                <a:latin typeface="Montserrat" panose="00000500000000000000" pitchFamily="2" charset="0"/>
-              </a:rPr>
-              <a:t>Artist …</a:t>
-            </a:r>
-          </a:p>
-        </p:txBody>
-      </p:sp>
-      <p:sp>
-        <p:nvSpPr>
           <p:cNvPr id="20" name="Rectangle: Rounded Corners 19">
             <a:extLst>
               <a:ext uri="{FF2B5EF4-FFF2-40B4-BE49-F238E27FC236}">
@@ -51835,8 +51795,8 @@
         </p:nvSpPr>
         <p:spPr>
           <a:xfrm>
-            <a:off x="6359559" y="3430624"/>
-            <a:ext cx="5747195" cy="410105"/>
+            <a:off x="814128" y="2584730"/>
+            <a:ext cx="8608491" cy="410105"/>
           </a:xfrm>
           <a:prstGeom prst="roundRect">
             <a:avLst/>
@@ -51887,7 +51847,7 @@
         </p:nvSpPr>
         <p:spPr>
           <a:xfrm>
-            <a:off x="6346326" y="3117797"/>
+            <a:off x="800895" y="2271903"/>
             <a:ext cx="1124211" cy="276999"/>
           </a:xfrm>
           <a:prstGeom prst="rect">
@@ -51927,7 +51887,7 @@
         </p:nvSpPr>
         <p:spPr>
           <a:xfrm>
-            <a:off x="6359559" y="3497176"/>
+            <a:off x="814128" y="2651282"/>
             <a:ext cx="1654260" cy="276999"/>
           </a:xfrm>
           <a:prstGeom prst="rect">
@@ -51969,8 +51929,8 @@
         </p:nvSpPr>
         <p:spPr>
           <a:xfrm>
-            <a:off x="6346327" y="4264221"/>
-            <a:ext cx="5747194" cy="410105"/>
+            <a:off x="800895" y="3418327"/>
+            <a:ext cx="8600101" cy="410105"/>
           </a:xfrm>
           <a:prstGeom prst="roundRect">
             <a:avLst/>
@@ -52021,7 +51981,7 @@
         </p:nvSpPr>
         <p:spPr>
           <a:xfrm>
-            <a:off x="6333093" y="3951394"/>
+            <a:off x="787662" y="3105500"/>
             <a:ext cx="1654260" cy="276999"/>
           </a:xfrm>
           <a:prstGeom prst="rect">
@@ -52061,7 +52021,7 @@
         </p:nvSpPr>
         <p:spPr>
           <a:xfrm>
-            <a:off x="6346326" y="4330773"/>
+            <a:off x="800895" y="3484879"/>
             <a:ext cx="1654260" cy="276999"/>
           </a:xfrm>
           <a:prstGeom prst="rect">
@@ -52210,8 +52170,8 @@
         </p:nvSpPr>
         <p:spPr>
           <a:xfrm>
-            <a:off x="6394695" y="6312601"/>
-            <a:ext cx="5695308" cy="410106"/>
+            <a:off x="9589134" y="4734206"/>
+            <a:ext cx="2414726" cy="410106"/>
           </a:xfrm>
           <a:prstGeom prst="roundRect">
             <a:avLst/>
@@ -52285,7 +52245,7 @@
         </p:blipFill>
         <p:spPr bwMode="auto">
           <a:xfrm>
-            <a:off x="8342236" y="6350433"/>
+            <a:off x="10038023" y="4774603"/>
             <a:ext cx="312825" cy="312825"/>
           </a:xfrm>
           <a:prstGeom prst="rect">
@@ -52317,8 +52277,8 @@
         </p:nvSpPr>
         <p:spPr>
           <a:xfrm>
-            <a:off x="6374112" y="5767202"/>
-            <a:ext cx="5722795" cy="410106"/>
+            <a:off x="9599946" y="4145877"/>
+            <a:ext cx="2414726" cy="410106"/>
           </a:xfrm>
           <a:prstGeom prst="roundRect">
             <a:avLst/>
@@ -52392,7 +52352,392 @@
         </p:blipFill>
         <p:spPr bwMode="auto">
           <a:xfrm>
-            <a:off x="8342236" y="5815842"/>
+            <a:off x="10038023" y="4213384"/>
+            <a:ext cx="312825" cy="312825"/>
+          </a:xfrm>
+          <a:prstGeom prst="rect">
+            <a:avLst/>
+          </a:prstGeom>
+          <a:noFill/>
+          <a:extLst>
+            <a:ext uri="{909E8E84-426E-40DD-AFC4-6F175D3DCCD1}">
+              <a14:hiddenFill xmlns:a14="http://schemas.microsoft.com/office/drawing/2010/main">
+                <a:solidFill>
+                  <a:srgbClr val="FFFFFF"/>
+                </a:solidFill>
+              </a14:hiddenFill>
+            </a:ext>
+          </a:extLst>
+        </p:spPr>
+      </p:pic>
+      <p:sp>
+        <p:nvSpPr>
+          <p:cNvPr id="16" name="Rectangle: Rounded Corners 15">
+            <a:extLst>
+              <a:ext uri="{FF2B5EF4-FFF2-40B4-BE49-F238E27FC236}">
+                <a16:creationId xmlns:a16="http://schemas.microsoft.com/office/drawing/2014/main" id="{3FCCDCC1-D5E9-F083-8A46-8805F39EBA91}"/>
+              </a:ext>
+            </a:extLst>
+          </p:cNvPr>
+          <p:cNvSpPr/>
+          <p:nvPr/>
+        </p:nvSpPr>
+        <p:spPr>
+          <a:xfrm>
+            <a:off x="900370" y="4364498"/>
+            <a:ext cx="1286240" cy="410105"/>
+          </a:xfrm>
+          <a:prstGeom prst="roundRect">
+            <a:avLst/>
+          </a:prstGeom>
+          <a:solidFill>
+            <a:srgbClr val="002646"/>
+          </a:solidFill>
+          <a:ln>
+            <a:noFill/>
+          </a:ln>
+        </p:spPr>
+        <p:style>
+          <a:lnRef idx="2">
+            <a:schemeClr val="accent1">
+              <a:shade val="15000"/>
+            </a:schemeClr>
+          </a:lnRef>
+          <a:fillRef idx="1">
+            <a:schemeClr val="accent1"/>
+          </a:fillRef>
+          <a:effectRef idx="0">
+            <a:schemeClr val="accent1"/>
+          </a:effectRef>
+          <a:fontRef idx="minor">
+            <a:schemeClr val="lt1"/>
+          </a:fontRef>
+        </p:style>
+        <p:txBody>
+          <a:bodyPr rtlCol="0" anchor="ctr"/>
+          <a:lstStyle/>
+          <a:p>
+            <a:pPr algn="ctr"/>
+            <a:r>
+              <a:rPr lang="en-US" sz="1200" noProof="0" dirty="0"/>
+              <a:t>F-777</a:t>
+            </a:r>
+          </a:p>
+        </p:txBody>
+      </p:sp>
+      <p:pic>
+        <p:nvPicPr>
+          <p:cNvPr id="28" name="Picture 4">
+            <a:extLst>
+              <a:ext uri="{FF2B5EF4-FFF2-40B4-BE49-F238E27FC236}">
+                <a16:creationId xmlns:a16="http://schemas.microsoft.com/office/drawing/2014/main" id="{350A3D3B-9B1B-6C18-7F38-4EDD437EB99A}"/>
+              </a:ext>
+            </a:extLst>
+          </p:cNvPr>
+          <p:cNvPicPr>
+            <a:picLocks noChangeAspect="1" noChangeArrowheads="1"/>
+          </p:cNvPicPr>
+          <p:nvPr/>
+        </p:nvPicPr>
+        <p:blipFill>
+          <a:blip r:embed="rId13">
+            <a:extLst>
+              <a:ext uri="{28A0092B-C50C-407E-A947-70E740481C1C}">
+                <a14:useLocalDpi xmlns:a14="http://schemas.microsoft.com/office/drawing/2010/main" val="0"/>
+              </a:ext>
+            </a:extLst>
+          </a:blip>
+          <a:srcRect/>
+          <a:stretch>
+            <a:fillRect/>
+          </a:stretch>
+        </p:blipFill>
+        <p:spPr bwMode="auto">
+          <a:xfrm>
+            <a:off x="1800630" y="4399298"/>
+            <a:ext cx="312825" cy="312825"/>
+          </a:xfrm>
+          <a:prstGeom prst="rect">
+            <a:avLst/>
+          </a:prstGeom>
+          <a:noFill/>
+          <a:extLst>
+            <a:ext uri="{909E8E84-426E-40DD-AFC4-6F175D3DCCD1}">
+              <a14:hiddenFill xmlns:a14="http://schemas.microsoft.com/office/drawing/2010/main">
+                <a:solidFill>
+                  <a:srgbClr val="FFFFFF"/>
+                </a:solidFill>
+              </a14:hiddenFill>
+            </a:ext>
+          </a:extLst>
+        </p:spPr>
+      </p:pic>
+      <p:sp>
+        <p:nvSpPr>
+          <p:cNvPr id="36" name="Rectangle: Rounded Corners 35">
+            <a:extLst>
+              <a:ext uri="{FF2B5EF4-FFF2-40B4-BE49-F238E27FC236}">
+                <a16:creationId xmlns:a16="http://schemas.microsoft.com/office/drawing/2014/main" id="{599EFCEC-11EE-D99B-A173-080C988FC6EC}"/>
+              </a:ext>
+            </a:extLst>
+          </p:cNvPr>
+          <p:cNvSpPr/>
+          <p:nvPr/>
+        </p:nvSpPr>
+        <p:spPr>
+          <a:xfrm>
+            <a:off x="814128" y="4945687"/>
+            <a:ext cx="3360420" cy="410105"/>
+          </a:xfrm>
+          <a:prstGeom prst="roundRect">
+            <a:avLst/>
+          </a:prstGeom>
+          <a:solidFill>
+            <a:srgbClr val="002646"/>
+          </a:solidFill>
+          <a:ln>
+            <a:noFill/>
+          </a:ln>
+        </p:spPr>
+        <p:style>
+          <a:lnRef idx="2">
+            <a:schemeClr val="accent1">
+              <a:shade val="15000"/>
+            </a:schemeClr>
+          </a:lnRef>
+          <a:fillRef idx="1">
+            <a:schemeClr val="accent1"/>
+          </a:fillRef>
+          <a:effectRef idx="0">
+            <a:schemeClr val="accent1"/>
+          </a:effectRef>
+          <a:fontRef idx="minor">
+            <a:schemeClr val="lt1"/>
+          </a:fontRef>
+        </p:style>
+        <p:txBody>
+          <a:bodyPr rtlCol="0" anchor="ctr"/>
+          <a:lstStyle/>
+          <a:p>
+            <a:pPr algn="ctr"/>
+            <a:endParaRPr lang="en-US" noProof="0" dirty="0"/>
+          </a:p>
+        </p:txBody>
+      </p:sp>
+      <p:sp>
+        <p:nvSpPr>
+          <p:cNvPr id="37" name="TextBox 36">
+            <a:extLst>
+              <a:ext uri="{FF2B5EF4-FFF2-40B4-BE49-F238E27FC236}">
+                <a16:creationId xmlns:a16="http://schemas.microsoft.com/office/drawing/2014/main" id="{35846852-0F14-F451-5155-6D6D9ED63F7D}"/>
+              </a:ext>
+            </a:extLst>
+          </p:cNvPr>
+          <p:cNvSpPr txBox="1"/>
+          <p:nvPr/>
+        </p:nvSpPr>
+        <p:spPr>
+          <a:xfrm>
+            <a:off x="822312" y="5027505"/>
+            <a:ext cx="1987693" cy="276999"/>
+          </a:xfrm>
+          <a:prstGeom prst="rect">
+            <a:avLst/>
+          </a:prstGeom>
+          <a:noFill/>
+        </p:spPr>
+        <p:txBody>
+          <a:bodyPr wrap="square" rtlCol="0">
+            <a:spAutoFit/>
+          </a:bodyPr>
+          <a:lstStyle/>
+          <a:p>
+            <a:r>
+              <a:rPr lang="en-US" sz="1200" noProof="0" dirty="0">
+                <a:solidFill>
+                  <a:schemeClr val="bg1">
+                    <a:lumMod val="65000"/>
+                  </a:schemeClr>
+                </a:solidFill>
+                <a:latin typeface="Montserrat" panose="00000500000000000000" pitchFamily="2" charset="0"/>
+              </a:rPr>
+              <a:t>Artist …</a:t>
+            </a:r>
+          </a:p>
+        </p:txBody>
+      </p:sp>
+      <p:cxnSp>
+        <p:nvCxnSpPr>
+          <p:cNvPr id="38" name="Straight Connector 37">
+            <a:extLst>
+              <a:ext uri="{FF2B5EF4-FFF2-40B4-BE49-F238E27FC236}">
+                <a16:creationId xmlns:a16="http://schemas.microsoft.com/office/drawing/2014/main" id="{E30DD5EA-C47A-128E-CD09-C8AC954A774B}"/>
+              </a:ext>
+            </a:extLst>
+          </p:cNvPr>
+          <p:cNvCxnSpPr>
+            <a:cxnSpLocks/>
+          </p:cNvCxnSpPr>
+          <p:nvPr/>
+        </p:nvCxnSpPr>
+        <p:spPr>
+          <a:xfrm>
+            <a:off x="3745757" y="4927570"/>
+            <a:ext cx="0" cy="428222"/>
+          </a:xfrm>
+          <a:prstGeom prst="line">
+            <a:avLst/>
+          </a:prstGeom>
+          <a:ln>
+            <a:solidFill>
+              <a:srgbClr val="00172B"/>
+            </a:solidFill>
+          </a:ln>
+        </p:spPr>
+        <p:style>
+          <a:lnRef idx="2">
+            <a:schemeClr val="accent1"/>
+          </a:lnRef>
+          <a:fillRef idx="0">
+            <a:schemeClr val="accent1"/>
+          </a:fillRef>
+          <a:effectRef idx="1">
+            <a:schemeClr val="accent1"/>
+          </a:effectRef>
+          <a:fontRef idx="minor">
+            <a:schemeClr val="tx1"/>
+          </a:fontRef>
+        </p:style>
+      </p:cxnSp>
+      <p:pic>
+        <p:nvPicPr>
+          <p:cNvPr id="39" name="Picture 16">
+            <a:extLst>
+              <a:ext uri="{FF2B5EF4-FFF2-40B4-BE49-F238E27FC236}">
+                <a16:creationId xmlns:a16="http://schemas.microsoft.com/office/drawing/2014/main" id="{6C7C76DA-D2D3-2A74-1EA7-82AF119FC6FC}"/>
+              </a:ext>
+            </a:extLst>
+          </p:cNvPr>
+          <p:cNvPicPr>
+            <a:picLocks noChangeAspect="1" noChangeArrowheads="1"/>
+          </p:cNvPicPr>
+          <p:nvPr/>
+        </p:nvPicPr>
+        <p:blipFill>
+          <a:blip r:embed="rId7">
+            <a:extLst>
+              <a:ext uri="{28A0092B-C50C-407E-A947-70E740481C1C}">
+                <a14:useLocalDpi xmlns:a14="http://schemas.microsoft.com/office/drawing/2010/main" val="0"/>
+              </a:ext>
+            </a:extLst>
+          </a:blip>
+          <a:srcRect/>
+          <a:stretch>
+            <a:fillRect/>
+          </a:stretch>
+        </p:blipFill>
+        <p:spPr bwMode="auto">
+          <a:xfrm>
+            <a:off x="3828709" y="5027505"/>
+            <a:ext cx="261734" cy="261734"/>
+          </a:xfrm>
+          <a:prstGeom prst="rect">
+            <a:avLst/>
+          </a:prstGeom>
+          <a:noFill/>
+          <a:extLst>
+            <a:ext uri="{909E8E84-426E-40DD-AFC4-6F175D3DCCD1}">
+              <a14:hiddenFill xmlns:a14="http://schemas.microsoft.com/office/drawing/2010/main">
+                <a:solidFill>
+                  <a:srgbClr val="FFFFFF"/>
+                </a:solidFill>
+              </a14:hiddenFill>
+            </a:ext>
+          </a:extLst>
+        </p:spPr>
+      </p:pic>
+      <p:sp>
+        <p:nvSpPr>
+          <p:cNvPr id="34" name="Rectangle: Rounded Corners 33">
+            <a:extLst>
+              <a:ext uri="{FF2B5EF4-FFF2-40B4-BE49-F238E27FC236}">
+                <a16:creationId xmlns:a16="http://schemas.microsoft.com/office/drawing/2014/main" id="{9CBCE951-CC68-6D78-09EC-1B68B17667B3}"/>
+              </a:ext>
+            </a:extLst>
+          </p:cNvPr>
+          <p:cNvSpPr/>
+          <p:nvPr/>
+        </p:nvSpPr>
+        <p:spPr>
+          <a:xfrm>
+            <a:off x="3771490" y="4945687"/>
+            <a:ext cx="423157" cy="410105"/>
+          </a:xfrm>
+          <a:prstGeom prst="roundRect">
+            <a:avLst/>
+          </a:prstGeom>
+          <a:solidFill>
+            <a:srgbClr val="2AB9D2"/>
+          </a:solidFill>
+          <a:ln>
+            <a:noFill/>
+          </a:ln>
+        </p:spPr>
+        <p:style>
+          <a:lnRef idx="2">
+            <a:schemeClr val="accent1">
+              <a:shade val="15000"/>
+            </a:schemeClr>
+          </a:lnRef>
+          <a:fillRef idx="1">
+            <a:schemeClr val="accent1"/>
+          </a:fillRef>
+          <a:effectRef idx="0">
+            <a:schemeClr val="accent1"/>
+          </a:effectRef>
+          <a:fontRef idx="minor">
+            <a:schemeClr val="lt1"/>
+          </a:fontRef>
+        </p:style>
+        <p:txBody>
+          <a:bodyPr rtlCol="0" anchor="ctr"/>
+          <a:lstStyle/>
+          <a:p>
+            <a:pPr algn="ctr"/>
+            <a:endParaRPr lang="en-US" sz="1200" noProof="0" dirty="0"/>
+          </a:p>
+        </p:txBody>
+      </p:sp>
+      <p:pic>
+        <p:nvPicPr>
+          <p:cNvPr id="35" name="Picture 4">
+            <a:extLst>
+              <a:ext uri="{FF2B5EF4-FFF2-40B4-BE49-F238E27FC236}">
+                <a16:creationId xmlns:a16="http://schemas.microsoft.com/office/drawing/2014/main" id="{CC1C47AD-CB0B-1064-0011-840FB995938D}"/>
+              </a:ext>
+            </a:extLst>
+          </p:cNvPr>
+          <p:cNvPicPr>
+            <a:picLocks noChangeAspect="1" noChangeArrowheads="1"/>
+          </p:cNvPicPr>
+          <p:nvPr/>
+        </p:nvPicPr>
+        <p:blipFill>
+          <a:blip r:embed="rId13">
+            <a:extLst>
+              <a:ext uri="{28A0092B-C50C-407E-A947-70E740481C1C}">
+                <a14:useLocalDpi xmlns:a14="http://schemas.microsoft.com/office/drawing/2010/main" val="0"/>
+              </a:ext>
+            </a:extLst>
+          </a:blip>
+          <a:srcRect/>
+          <a:stretch>
+            <a:fillRect/>
+          </a:stretch>
+        </p:blipFill>
+        <p:spPr bwMode="auto">
+          <a:xfrm>
+            <a:off x="3826655" y="4994326"/>
             <a:ext cx="312825" cy="312825"/>
           </a:xfrm>
           <a:prstGeom prst="rect">

</xml_diff>